<commit_message>
Alterações para funcionar no Linux
</commit_message>
<xml_diff>
--- a/documentacao/Apresentações/Sprint 3.pptx
+++ b/documentacao/Apresentações/Sprint 3.pptx
@@ -5,7 +5,7 @@
     <p:sldMasterId id="2147483672" r:id="rId1"/>
   </p:sldMasterIdLst>
   <p:notesMasterIdLst>
-    <p:notesMasterId r:id="rId15"/>
+    <p:notesMasterId r:id="rId18"/>
   </p:notesMasterIdLst>
   <p:sldIdLst>
     <p:sldId id="270" r:id="rId2"/>
@@ -21,6 +21,9 @@
     <p:sldId id="264" r:id="rId12"/>
     <p:sldId id="272" r:id="rId13"/>
     <p:sldId id="267" r:id="rId14"/>
+    <p:sldId id="277" r:id="rId15"/>
+    <p:sldId id="265" r:id="rId16"/>
+    <p:sldId id="275" r:id="rId17"/>
   </p:sldIdLst>
   <p:sldSz cx="12192000" cy="6858000"/>
   <p:notesSz cx="6858000" cy="9144000"/>
@@ -347,7 +350,7 @@
           <a:p>
             <a:fld id="{6B8A6EFA-F786-4350-B5C0-B2D15D16C623}" type="datetimeFigureOut">
               <a:rPr lang="pt-BR" smtClean="0"/>
-              <a:t>25/05/2020</a:t>
+              <a:t>19/06/2020</a:t>
             </a:fld>
             <a:endParaRPr lang="pt-BR"/>
           </a:p>
@@ -745,7 +748,7 @@
           <a:p>
             <a:fld id="{04EB4EB8-E196-44D9-8FC3-6021E77C51A4}" type="datetimeFigureOut">
               <a:rPr lang="pt-BR" smtClean="0"/>
-              <a:t>25/05/2020</a:t>
+              <a:t>19/06/2020</a:t>
             </a:fld>
             <a:endParaRPr lang="pt-BR"/>
           </a:p>
@@ -915,7 +918,7 @@
           <a:p>
             <a:fld id="{04EB4EB8-E196-44D9-8FC3-6021E77C51A4}" type="datetimeFigureOut">
               <a:rPr lang="pt-BR" smtClean="0"/>
-              <a:t>25/05/2020</a:t>
+              <a:t>19/06/2020</a:t>
             </a:fld>
             <a:endParaRPr lang="pt-BR"/>
           </a:p>
@@ -1095,7 +1098,7 @@
           <a:p>
             <a:fld id="{04EB4EB8-E196-44D9-8FC3-6021E77C51A4}" type="datetimeFigureOut">
               <a:rPr lang="pt-BR" smtClean="0"/>
-              <a:t>25/05/2020</a:t>
+              <a:t>19/06/2020</a:t>
             </a:fld>
             <a:endParaRPr lang="pt-BR"/>
           </a:p>
@@ -1265,7 +1268,7 @@
           <a:p>
             <a:fld id="{04EB4EB8-E196-44D9-8FC3-6021E77C51A4}" type="datetimeFigureOut">
               <a:rPr lang="pt-BR" smtClean="0"/>
-              <a:t>25/05/2020</a:t>
+              <a:t>19/06/2020</a:t>
             </a:fld>
             <a:endParaRPr lang="pt-BR"/>
           </a:p>
@@ -1511,7 +1514,7 @@
           <a:p>
             <a:fld id="{04EB4EB8-E196-44D9-8FC3-6021E77C51A4}" type="datetimeFigureOut">
               <a:rPr lang="pt-BR" smtClean="0"/>
-              <a:t>25/05/2020</a:t>
+              <a:t>19/06/2020</a:t>
             </a:fld>
             <a:endParaRPr lang="pt-BR"/>
           </a:p>
@@ -1743,7 +1746,7 @@
           <a:p>
             <a:fld id="{04EB4EB8-E196-44D9-8FC3-6021E77C51A4}" type="datetimeFigureOut">
               <a:rPr lang="pt-BR" smtClean="0"/>
-              <a:t>25/05/2020</a:t>
+              <a:t>19/06/2020</a:t>
             </a:fld>
             <a:endParaRPr lang="pt-BR"/>
           </a:p>
@@ -2110,7 +2113,7 @@
           <a:p>
             <a:fld id="{04EB4EB8-E196-44D9-8FC3-6021E77C51A4}" type="datetimeFigureOut">
               <a:rPr lang="pt-BR" smtClean="0"/>
-              <a:t>25/05/2020</a:t>
+              <a:t>19/06/2020</a:t>
             </a:fld>
             <a:endParaRPr lang="pt-BR"/>
           </a:p>
@@ -2228,7 +2231,7 @@
           <a:p>
             <a:fld id="{04EB4EB8-E196-44D9-8FC3-6021E77C51A4}" type="datetimeFigureOut">
               <a:rPr lang="pt-BR" smtClean="0"/>
-              <a:t>25/05/2020</a:t>
+              <a:t>19/06/2020</a:t>
             </a:fld>
             <a:endParaRPr lang="pt-BR"/>
           </a:p>
@@ -2323,7 +2326,7 @@
           <a:p>
             <a:fld id="{04EB4EB8-E196-44D9-8FC3-6021E77C51A4}" type="datetimeFigureOut">
               <a:rPr lang="pt-BR" smtClean="0"/>
-              <a:t>25/05/2020</a:t>
+              <a:t>19/06/2020</a:t>
             </a:fld>
             <a:endParaRPr lang="pt-BR"/>
           </a:p>
@@ -2600,7 +2603,7 @@
           <a:p>
             <a:fld id="{04EB4EB8-E196-44D9-8FC3-6021E77C51A4}" type="datetimeFigureOut">
               <a:rPr lang="pt-BR" smtClean="0"/>
-              <a:t>25/05/2020</a:t>
+              <a:t>19/06/2020</a:t>
             </a:fld>
             <a:endParaRPr lang="pt-BR"/>
           </a:p>
@@ -2857,7 +2860,7 @@
           <a:p>
             <a:fld id="{04EB4EB8-E196-44D9-8FC3-6021E77C51A4}" type="datetimeFigureOut">
               <a:rPr lang="pt-BR" smtClean="0"/>
-              <a:t>25/05/2020</a:t>
+              <a:t>19/06/2020</a:t>
             </a:fld>
             <a:endParaRPr lang="pt-BR"/>
           </a:p>
@@ -3070,7 +3073,7 @@
           <a:p>
             <a:fld id="{04EB4EB8-E196-44D9-8FC3-6021E77C51A4}" type="datetimeFigureOut">
               <a:rPr lang="pt-BR" smtClean="0"/>
-              <a:t>25/05/2020</a:t>
+              <a:t>19/06/2020</a:t>
             </a:fld>
             <a:endParaRPr lang="pt-BR"/>
           </a:p>
@@ -4590,6 +4593,614 @@
 </p:sld>
 </file>
 
+<file path=ppt/slides/slide14.xml><?xml version="1.0" encoding="utf-8"?>
+<p:sld xmlns:a="http://schemas.openxmlformats.org/drawingml/2006/main" xmlns:r="http://schemas.openxmlformats.org/officeDocument/2006/relationships" xmlns:p="http://schemas.openxmlformats.org/presentationml/2006/main">
+  <p:cSld>
+    <p:spTree>
+      <p:nvGrpSpPr>
+        <p:cNvPr id="1" name=""/>
+        <p:cNvGrpSpPr/>
+        <p:nvPr/>
+      </p:nvGrpSpPr>
+      <p:grpSpPr>
+        <a:xfrm>
+          <a:off x="0" y="0"/>
+          <a:ext cx="0" cy="0"/>
+          <a:chOff x="0" y="0"/>
+          <a:chExt cx="0" cy="0"/>
+        </a:xfrm>
+      </p:grpSpPr>
+      <p:sp>
+        <p:nvSpPr>
+          <p:cNvPr id="4" name="Título 1">
+            <a:extLst>
+              <a:ext uri="{FF2B5EF4-FFF2-40B4-BE49-F238E27FC236}">
+                <a16:creationId xmlns:a16="http://schemas.microsoft.com/office/drawing/2014/main" id="{8A3DDD9E-D767-4715-9081-18F00E5E9DEF}"/>
+              </a:ext>
+            </a:extLst>
+          </p:cNvPr>
+          <p:cNvSpPr txBox="1">
+            <a:spLocks/>
+          </p:cNvSpPr>
+          <p:nvPr/>
+        </p:nvSpPr>
+        <p:spPr>
+          <a:xfrm>
+            <a:off x="454478" y="419099"/>
+            <a:ext cx="5495748" cy="790577"/>
+          </a:xfrm>
+          <a:prstGeom prst="rect">
+            <a:avLst/>
+          </a:prstGeom>
+        </p:spPr>
+        <p:txBody>
+          <a:bodyPr vert="horz" lIns="91440" tIns="45720" rIns="91440" bIns="45720" rtlCol="0" anchor="ctr">
+            <a:normAutofit/>
+          </a:bodyPr>
+          <a:lstStyle>
+            <a:lvl1pPr algn="l" defTabSz="914400" rtl="0" eaLnBrk="1" latinLnBrk="0" hangingPunct="1">
+              <a:lnSpc>
+                <a:spcPct val="90000"/>
+              </a:lnSpc>
+              <a:spcBef>
+                <a:spcPct val="0"/>
+              </a:spcBef>
+              <a:buNone/>
+              <a:defRPr sz="4400" kern="1200">
+                <a:solidFill>
+                  <a:schemeClr val="tx1"/>
+                </a:solidFill>
+                <a:latin typeface="+mj-lt"/>
+                <a:ea typeface="+mj-ea"/>
+                <a:cs typeface="+mj-cs"/>
+              </a:defRPr>
+            </a:lvl1pPr>
+          </a:lstStyle>
+          <a:p>
+            <a:r>
+              <a:rPr lang="pt-BR" sz="3200" dirty="0">
+                <a:solidFill>
+                  <a:srgbClr val="4DB033"/>
+                </a:solidFill>
+                <a:latin typeface="Dubai Medium" panose="020B0603030403030204" pitchFamily="34" charset="-78"/>
+                <a:cs typeface="Dubai Medium" panose="020B0603030403030204" pitchFamily="34" charset="-78"/>
+              </a:rPr>
+              <a:t>Anexos</a:t>
+            </a:r>
+          </a:p>
+        </p:txBody>
+      </p:sp>
+      <p:cxnSp>
+        <p:nvCxnSpPr>
+          <p:cNvPr id="5" name="Conector reto 4">
+            <a:extLst>
+              <a:ext uri="{FF2B5EF4-FFF2-40B4-BE49-F238E27FC236}">
+                <a16:creationId xmlns:a16="http://schemas.microsoft.com/office/drawing/2014/main" id="{5D134784-0526-488A-A65B-53E07D6BD493}"/>
+              </a:ext>
+            </a:extLst>
+          </p:cNvPr>
+          <p:cNvCxnSpPr>
+            <a:cxnSpLocks/>
+          </p:cNvCxnSpPr>
+          <p:nvPr/>
+        </p:nvCxnSpPr>
+        <p:spPr>
+          <a:xfrm flipH="1">
+            <a:off x="3" y="981076"/>
+            <a:ext cx="2598054" cy="0"/>
+          </a:xfrm>
+          <a:prstGeom prst="line">
+            <a:avLst/>
+          </a:prstGeom>
+          <a:ln>
+            <a:solidFill>
+              <a:srgbClr val="6B1979"/>
+            </a:solidFill>
+          </a:ln>
+          <a:effectLst>
+            <a:glow rad="63500">
+              <a:srgbClr val="6B1979">
+                <a:alpha val="40000"/>
+              </a:srgbClr>
+            </a:glow>
+          </a:effectLst>
+        </p:spPr>
+        <p:style>
+          <a:lnRef idx="1">
+            <a:schemeClr val="accent1"/>
+          </a:lnRef>
+          <a:fillRef idx="0">
+            <a:schemeClr val="accent1"/>
+          </a:fillRef>
+          <a:effectRef idx="0">
+            <a:schemeClr val="accent1"/>
+          </a:effectRef>
+          <a:fontRef idx="minor">
+            <a:schemeClr val="tx1"/>
+          </a:fontRef>
+        </p:style>
+      </p:cxnSp>
+      <p:pic>
+        <p:nvPicPr>
+          <p:cNvPr id="7" name="Espaço Reservado para Conteúdo 5" descr="Uma imagem contendo desenho&#10;&#10;Descrição gerada automaticamente">
+            <a:extLst>
+              <a:ext uri="{FF2B5EF4-FFF2-40B4-BE49-F238E27FC236}">
+                <a16:creationId xmlns:a16="http://schemas.microsoft.com/office/drawing/2014/main" id="{86B231F3-A698-402E-8852-6BFE2251DA0F}"/>
+              </a:ext>
+            </a:extLst>
+          </p:cNvPr>
+          <p:cNvPicPr>
+            <a:picLocks noChangeAspect="1"/>
+          </p:cNvPicPr>
+          <p:nvPr/>
+        </p:nvPicPr>
+        <p:blipFill>
+          <a:blip r:embed="rId2">
+            <a:extLst>
+              <a:ext uri="{28A0092B-C50C-407E-A947-70E740481C1C}">
+                <a14:useLocalDpi xmlns:a14="http://schemas.microsoft.com/office/drawing/2010/main" val="0"/>
+              </a:ext>
+            </a:extLst>
+          </a:blip>
+          <a:stretch>
+            <a:fillRect/>
+          </a:stretch>
+        </p:blipFill>
+        <p:spPr>
+          <a:xfrm>
+            <a:off x="10286734" y="-387713"/>
+            <a:ext cx="1905266" cy="1905266"/>
+          </a:xfrm>
+          <a:prstGeom prst="rect">
+            <a:avLst/>
+          </a:prstGeom>
+        </p:spPr>
+      </p:pic>
+      <p:pic>
+        <p:nvPicPr>
+          <p:cNvPr id="1026" name="Picture 2" descr="Anexo - ícones de ferramentas de edição grátis">
+            <a:extLst>
+              <a:ext uri="{FF2B5EF4-FFF2-40B4-BE49-F238E27FC236}">
+                <a16:creationId xmlns:a16="http://schemas.microsoft.com/office/drawing/2014/main" id="{79369D6A-53FD-4C45-AEFC-99CC73DA3389}"/>
+              </a:ext>
+            </a:extLst>
+          </p:cNvPr>
+          <p:cNvPicPr>
+            <a:picLocks noChangeAspect="1" noChangeArrowheads="1"/>
+          </p:cNvPicPr>
+          <p:nvPr/>
+        </p:nvPicPr>
+        <p:blipFill>
+          <a:blip r:embed="rId3">
+            <a:extLst>
+              <a:ext uri="{28A0092B-C50C-407E-A947-70E740481C1C}">
+                <a14:useLocalDpi xmlns:a14="http://schemas.microsoft.com/office/drawing/2010/main" val="0"/>
+              </a:ext>
+            </a:extLst>
+          </a:blip>
+          <a:srcRect/>
+          <a:stretch>
+            <a:fillRect/>
+          </a:stretch>
+        </p:blipFill>
+        <p:spPr bwMode="auto">
+          <a:xfrm>
+            <a:off x="3797680" y="1376776"/>
+            <a:ext cx="4596640" cy="4596640"/>
+          </a:xfrm>
+          <a:prstGeom prst="rect">
+            <a:avLst/>
+          </a:prstGeom>
+          <a:noFill/>
+          <a:extLst>
+            <a:ext uri="{909E8E84-426E-40DD-AFC4-6F175D3DCCD1}">
+              <a14:hiddenFill xmlns:a14="http://schemas.microsoft.com/office/drawing/2010/main">
+                <a:solidFill>
+                  <a:srgbClr val="FFFFFF"/>
+                </a:solidFill>
+              </a14:hiddenFill>
+            </a:ext>
+          </a:extLst>
+        </p:spPr>
+      </p:pic>
+    </p:spTree>
+    <p:extLst>
+      <p:ext uri="{BB962C8B-B14F-4D97-AF65-F5344CB8AC3E}">
+        <p14:creationId xmlns:p14="http://schemas.microsoft.com/office/powerpoint/2010/main" val="735745732"/>
+      </p:ext>
+    </p:extLst>
+  </p:cSld>
+  <p:clrMapOvr>
+    <a:masterClrMapping/>
+  </p:clrMapOvr>
+</p:sld>
+</file>
+
+<file path=ppt/slides/slide15.xml><?xml version="1.0" encoding="utf-8"?>
+<p:sld xmlns:a="http://schemas.openxmlformats.org/drawingml/2006/main" xmlns:r="http://schemas.openxmlformats.org/officeDocument/2006/relationships" xmlns:p="http://schemas.openxmlformats.org/presentationml/2006/main">
+  <p:cSld>
+    <p:spTree>
+      <p:nvGrpSpPr>
+        <p:cNvPr id="1" name=""/>
+        <p:cNvGrpSpPr/>
+        <p:nvPr/>
+      </p:nvGrpSpPr>
+      <p:grpSpPr>
+        <a:xfrm>
+          <a:off x="0" y="0"/>
+          <a:ext cx="0" cy="0"/>
+          <a:chOff x="0" y="0"/>
+          <a:chExt cx="0" cy="0"/>
+        </a:xfrm>
+      </p:grpSpPr>
+      <p:pic>
+        <p:nvPicPr>
+          <p:cNvPr id="12" name="Espaço Reservado para Conteúdo 11" descr="Tela de celular com texto preto sobre fundo branco&#10;&#10;Descrição gerada automaticamente">
+            <a:extLst>
+              <a:ext uri="{FF2B5EF4-FFF2-40B4-BE49-F238E27FC236}">
+                <a16:creationId xmlns:a16="http://schemas.microsoft.com/office/drawing/2014/main" id="{15E3F733-7528-4B05-BCE5-0A3FBA8E6B20}"/>
+              </a:ext>
+            </a:extLst>
+          </p:cNvPr>
+          <p:cNvPicPr>
+            <a:picLocks noGrp="1" noChangeAspect="1"/>
+          </p:cNvPicPr>
+          <p:nvPr>
+            <p:ph idx="1"/>
+          </p:nvPr>
+        </p:nvPicPr>
+        <p:blipFill>
+          <a:blip r:embed="rId2">
+            <a:extLst>
+              <a:ext uri="{28A0092B-C50C-407E-A947-70E740481C1C}">
+                <a14:useLocalDpi xmlns:a14="http://schemas.microsoft.com/office/drawing/2010/main" val="0"/>
+              </a:ext>
+            </a:extLst>
+          </a:blip>
+          <a:stretch>
+            <a:fillRect/>
+          </a:stretch>
+        </p:blipFill>
+        <p:spPr>
+          <a:xfrm>
+            <a:off x="2064775" y="165053"/>
+            <a:ext cx="8347586" cy="6605584"/>
+          </a:xfrm>
+        </p:spPr>
+      </p:pic>
+      <p:sp>
+        <p:nvSpPr>
+          <p:cNvPr id="2" name="Título 1">
+            <a:extLst>
+              <a:ext uri="{FF2B5EF4-FFF2-40B4-BE49-F238E27FC236}">
+                <a16:creationId xmlns:a16="http://schemas.microsoft.com/office/drawing/2014/main" id="{BE6D8F10-9168-4897-A64A-2723EE6250FA}"/>
+              </a:ext>
+            </a:extLst>
+          </p:cNvPr>
+          <p:cNvSpPr>
+            <a:spLocks noGrp="1"/>
+          </p:cNvSpPr>
+          <p:nvPr>
+            <p:ph type="title"/>
+          </p:nvPr>
+        </p:nvSpPr>
+        <p:spPr>
+          <a:xfrm>
+            <a:off x="285136" y="464015"/>
+            <a:ext cx="5412921" cy="660399"/>
+          </a:xfrm>
+        </p:spPr>
+        <p:txBody>
+          <a:bodyPr>
+            <a:normAutofit/>
+          </a:bodyPr>
+          <a:lstStyle/>
+          <a:p>
+            <a:r>
+              <a:rPr lang="pt-BR" sz="3200" dirty="0">
+                <a:solidFill>
+                  <a:srgbClr val="4DB033"/>
+                </a:solidFill>
+                <a:latin typeface="Dubai Medium" panose="020B0603030403030204" pitchFamily="34" charset="-78"/>
+                <a:cs typeface="Dubai Medium" panose="020B0603030403030204" pitchFamily="34" charset="-78"/>
+              </a:rPr>
+              <a:t>Diagrama Lógico BD</a:t>
+            </a:r>
+          </a:p>
+        </p:txBody>
+      </p:sp>
+      <p:cxnSp>
+        <p:nvCxnSpPr>
+          <p:cNvPr id="10" name="Conector reto 9">
+            <a:extLst>
+              <a:ext uri="{FF2B5EF4-FFF2-40B4-BE49-F238E27FC236}">
+                <a16:creationId xmlns:a16="http://schemas.microsoft.com/office/drawing/2014/main" id="{B0260FB3-F747-4ADD-A7B2-81FDF008C973}"/>
+              </a:ext>
+            </a:extLst>
+          </p:cNvPr>
+          <p:cNvCxnSpPr>
+            <a:cxnSpLocks/>
+          </p:cNvCxnSpPr>
+          <p:nvPr/>
+        </p:nvCxnSpPr>
+        <p:spPr>
+          <a:xfrm flipH="1">
+            <a:off x="2" y="981076"/>
+            <a:ext cx="4129546" cy="0"/>
+          </a:xfrm>
+          <a:prstGeom prst="line">
+            <a:avLst/>
+          </a:prstGeom>
+          <a:ln>
+            <a:solidFill>
+              <a:srgbClr val="6B1979"/>
+            </a:solidFill>
+          </a:ln>
+          <a:effectLst>
+            <a:glow rad="63500">
+              <a:srgbClr val="6B1979">
+                <a:alpha val="40000"/>
+              </a:srgbClr>
+            </a:glow>
+          </a:effectLst>
+        </p:spPr>
+        <p:style>
+          <a:lnRef idx="1">
+            <a:schemeClr val="accent1"/>
+          </a:lnRef>
+          <a:fillRef idx="0">
+            <a:schemeClr val="accent1"/>
+          </a:fillRef>
+          <a:effectRef idx="0">
+            <a:schemeClr val="accent1"/>
+          </a:effectRef>
+          <a:fontRef idx="minor">
+            <a:schemeClr val="tx1"/>
+          </a:fontRef>
+        </p:style>
+      </p:cxnSp>
+      <p:pic>
+        <p:nvPicPr>
+          <p:cNvPr id="6" name="Espaço Reservado para Conteúdo 5" descr="Uma imagem contendo desenho&#10;&#10;Descrição gerada automaticamente">
+            <a:extLst>
+              <a:ext uri="{FF2B5EF4-FFF2-40B4-BE49-F238E27FC236}">
+                <a16:creationId xmlns:a16="http://schemas.microsoft.com/office/drawing/2014/main" id="{47A08B82-963C-4891-9394-22966D814E73}"/>
+              </a:ext>
+            </a:extLst>
+          </p:cNvPr>
+          <p:cNvPicPr>
+            <a:picLocks noChangeAspect="1"/>
+          </p:cNvPicPr>
+          <p:nvPr/>
+        </p:nvPicPr>
+        <p:blipFill>
+          <a:blip r:embed="rId3">
+            <a:extLst>
+              <a:ext uri="{28A0092B-C50C-407E-A947-70E740481C1C}">
+                <a14:useLocalDpi xmlns:a14="http://schemas.microsoft.com/office/drawing/2010/main" val="0"/>
+              </a:ext>
+            </a:extLst>
+          </a:blip>
+          <a:stretch>
+            <a:fillRect/>
+          </a:stretch>
+        </p:blipFill>
+        <p:spPr>
+          <a:xfrm>
+            <a:off x="10286734" y="-387713"/>
+            <a:ext cx="1905266" cy="1905266"/>
+          </a:xfrm>
+          <a:prstGeom prst="rect">
+            <a:avLst/>
+          </a:prstGeom>
+        </p:spPr>
+      </p:pic>
+    </p:spTree>
+    <p:extLst>
+      <p:ext uri="{BB962C8B-B14F-4D97-AF65-F5344CB8AC3E}">
+        <p14:creationId xmlns:p14="http://schemas.microsoft.com/office/powerpoint/2010/main" val="384798924"/>
+      </p:ext>
+    </p:extLst>
+  </p:cSld>
+  <p:clrMapOvr>
+    <a:masterClrMapping/>
+  </p:clrMapOvr>
+</p:sld>
+</file>
+
+<file path=ppt/slides/slide16.xml><?xml version="1.0" encoding="utf-8"?>
+<p:sld xmlns:a="http://schemas.openxmlformats.org/drawingml/2006/main" xmlns:r="http://schemas.openxmlformats.org/officeDocument/2006/relationships" xmlns:p="http://schemas.openxmlformats.org/presentationml/2006/main">
+  <p:cSld>
+    <p:spTree>
+      <p:nvGrpSpPr>
+        <p:cNvPr id="1" name=""/>
+        <p:cNvGrpSpPr/>
+        <p:nvPr/>
+      </p:nvGrpSpPr>
+      <p:grpSpPr>
+        <a:xfrm>
+          <a:off x="0" y="0"/>
+          <a:ext cx="0" cy="0"/>
+          <a:chOff x="0" y="0"/>
+          <a:chExt cx="0" cy="0"/>
+        </a:xfrm>
+      </p:grpSpPr>
+      <p:sp>
+        <p:nvSpPr>
+          <p:cNvPr id="2" name="Título 1">
+            <a:extLst>
+              <a:ext uri="{FF2B5EF4-FFF2-40B4-BE49-F238E27FC236}">
+                <a16:creationId xmlns:a16="http://schemas.microsoft.com/office/drawing/2014/main" id="{BE6D8F10-9168-4897-A64A-2723EE6250FA}"/>
+              </a:ext>
+            </a:extLst>
+          </p:cNvPr>
+          <p:cNvSpPr>
+            <a:spLocks noGrp="1"/>
+          </p:cNvSpPr>
+          <p:nvPr>
+            <p:ph type="title"/>
+          </p:nvPr>
+        </p:nvSpPr>
+        <p:spPr>
+          <a:xfrm>
+            <a:off x="454479" y="450851"/>
+            <a:ext cx="3848100" cy="758825"/>
+          </a:xfrm>
+        </p:spPr>
+        <p:txBody>
+          <a:bodyPr>
+            <a:normAutofit/>
+          </a:bodyPr>
+          <a:lstStyle/>
+          <a:p>
+            <a:r>
+              <a:rPr lang="pt-BR" sz="3200" dirty="0">
+                <a:solidFill>
+                  <a:srgbClr val="4DB033"/>
+                </a:solidFill>
+                <a:latin typeface="Dubai Medium" panose="020B0603030403030204" pitchFamily="34" charset="-78"/>
+                <a:cs typeface="Dubai Medium" panose="020B0603030403030204" pitchFamily="34" charset="-78"/>
+              </a:rPr>
+              <a:t>Diagrama de Solução</a:t>
+            </a:r>
+          </a:p>
+        </p:txBody>
+      </p:sp>
+      <p:cxnSp>
+        <p:nvCxnSpPr>
+          <p:cNvPr id="10" name="Conector reto 9">
+            <a:extLst>
+              <a:ext uri="{FF2B5EF4-FFF2-40B4-BE49-F238E27FC236}">
+                <a16:creationId xmlns:a16="http://schemas.microsoft.com/office/drawing/2014/main" id="{B0260FB3-F747-4ADD-A7B2-81FDF008C973}"/>
+              </a:ext>
+            </a:extLst>
+          </p:cNvPr>
+          <p:cNvCxnSpPr>
+            <a:cxnSpLocks/>
+          </p:cNvCxnSpPr>
+          <p:nvPr/>
+        </p:nvCxnSpPr>
+        <p:spPr>
+          <a:xfrm flipH="1">
+            <a:off x="0" y="981076"/>
+            <a:ext cx="4067177" cy="0"/>
+          </a:xfrm>
+          <a:prstGeom prst="line">
+            <a:avLst/>
+          </a:prstGeom>
+          <a:ln>
+            <a:solidFill>
+              <a:srgbClr val="6B1979"/>
+            </a:solidFill>
+          </a:ln>
+          <a:effectLst>
+            <a:glow rad="63500">
+              <a:srgbClr val="6B1979">
+                <a:alpha val="40000"/>
+              </a:srgbClr>
+            </a:glow>
+          </a:effectLst>
+        </p:spPr>
+        <p:style>
+          <a:lnRef idx="1">
+            <a:schemeClr val="accent1"/>
+          </a:lnRef>
+          <a:fillRef idx="0">
+            <a:schemeClr val="accent1"/>
+          </a:fillRef>
+          <a:effectRef idx="0">
+            <a:schemeClr val="accent1"/>
+          </a:effectRef>
+          <a:fontRef idx="minor">
+            <a:schemeClr val="tx1"/>
+          </a:fontRef>
+        </p:style>
+      </p:cxnSp>
+      <p:pic>
+        <p:nvPicPr>
+          <p:cNvPr id="5" name="Espaço Reservado para Conteúdo 5" descr="Uma imagem contendo desenho&#10;&#10;Descrição gerada automaticamente">
+            <a:extLst>
+              <a:ext uri="{FF2B5EF4-FFF2-40B4-BE49-F238E27FC236}">
+                <a16:creationId xmlns:a16="http://schemas.microsoft.com/office/drawing/2014/main" id="{E3A68BA6-C565-404A-85FD-C016A2F4F627}"/>
+              </a:ext>
+            </a:extLst>
+          </p:cNvPr>
+          <p:cNvPicPr>
+            <a:picLocks noChangeAspect="1"/>
+          </p:cNvPicPr>
+          <p:nvPr/>
+        </p:nvPicPr>
+        <p:blipFill>
+          <a:blip r:embed="rId2">
+            <a:extLst>
+              <a:ext uri="{28A0092B-C50C-407E-A947-70E740481C1C}">
+                <a14:useLocalDpi xmlns:a14="http://schemas.microsoft.com/office/drawing/2010/main" val="0"/>
+              </a:ext>
+            </a:extLst>
+          </a:blip>
+          <a:stretch>
+            <a:fillRect/>
+          </a:stretch>
+        </p:blipFill>
+        <p:spPr>
+          <a:xfrm>
+            <a:off x="10286734" y="-387713"/>
+            <a:ext cx="1905266" cy="1905266"/>
+          </a:xfrm>
+          <a:prstGeom prst="rect">
+            <a:avLst/>
+          </a:prstGeom>
+        </p:spPr>
+      </p:pic>
+      <p:pic>
+        <p:nvPicPr>
+          <p:cNvPr id="8" name="Imagem 7" descr="Uma imagem contendo screenshot&#10;&#10;Descrição gerada automaticamente">
+            <a:extLst>
+              <a:ext uri="{FF2B5EF4-FFF2-40B4-BE49-F238E27FC236}">
+                <a16:creationId xmlns:a16="http://schemas.microsoft.com/office/drawing/2014/main" id="{107F6E7A-138D-468B-A018-0082B42F9018}"/>
+              </a:ext>
+            </a:extLst>
+          </p:cNvPr>
+          <p:cNvPicPr>
+            <a:picLocks noChangeAspect="1"/>
+          </p:cNvPicPr>
+          <p:nvPr/>
+        </p:nvPicPr>
+        <p:blipFill>
+          <a:blip r:embed="rId3">
+            <a:extLst>
+              <a:ext uri="{28A0092B-C50C-407E-A947-70E740481C1C}">
+                <a14:useLocalDpi xmlns:a14="http://schemas.microsoft.com/office/drawing/2010/main" val="0"/>
+              </a:ext>
+            </a:extLst>
+          </a:blip>
+          <a:stretch>
+            <a:fillRect/>
+          </a:stretch>
+        </p:blipFill>
+        <p:spPr>
+          <a:xfrm>
+            <a:off x="1390960" y="1054110"/>
+            <a:ext cx="9410079" cy="5353039"/>
+          </a:xfrm>
+          <a:prstGeom prst="rect">
+            <a:avLst/>
+          </a:prstGeom>
+        </p:spPr>
+      </p:pic>
+    </p:spTree>
+    <p:extLst>
+      <p:ext uri="{BB962C8B-B14F-4D97-AF65-F5344CB8AC3E}">
+        <p14:creationId xmlns:p14="http://schemas.microsoft.com/office/powerpoint/2010/main" val="1295345417"/>
+      </p:ext>
+    </p:extLst>
+  </p:cSld>
+  <p:clrMapOvr>
+    <a:masterClrMapping/>
+  </p:clrMapOvr>
+</p:sld>
+</file>
+
 <file path=ppt/slides/slide2.xml><?xml version="1.0" encoding="utf-8"?>
 <p:sld xmlns:a="http://schemas.openxmlformats.org/drawingml/2006/main" xmlns:r="http://schemas.openxmlformats.org/officeDocument/2006/relationships" xmlns:p="http://schemas.openxmlformats.org/presentationml/2006/main">
   <p:cSld>
@@ -7254,7 +7865,7 @@
         </p:nvSpPr>
         <p:spPr>
           <a:xfrm>
-            <a:off x="-5731329" y="-5190270"/>
+            <a:off x="-5863771" y="-5190270"/>
             <a:ext cx="14020800" cy="14020800"/>
           </a:xfrm>
           <a:prstGeom prst="ellipse">
@@ -7339,7 +7950,7 @@
                 <a:latin typeface="Dubai" panose="020B0503030403030204" pitchFamily="34" charset="-78"/>
                 <a:cs typeface="Dubai" panose="020B0503030403030204" pitchFamily="34" charset="-78"/>
               </a:rPr>
-              <a:t>Alprime</a:t>
+              <a:t>AlPrime</a:t>
             </a:r>
             <a:r>
               <a:rPr lang="pt-BR" dirty="0">
@@ -10147,8 +10758,8 @@
         </p:nvSpPr>
         <p:spPr>
           <a:xfrm>
-            <a:off x="454479" y="450851"/>
-            <a:ext cx="3848100" cy="758825"/>
+            <a:off x="454478" y="450851"/>
+            <a:ext cx="4409069" cy="758825"/>
           </a:xfrm>
         </p:spPr>
         <p:txBody>
@@ -10165,7 +10776,7 @@
                 <a:latin typeface="Dubai Medium" panose="020B0603030403030204" pitchFamily="34" charset="-78"/>
                 <a:cs typeface="Dubai Medium" panose="020B0603030403030204" pitchFamily="34" charset="-78"/>
               </a:rPr>
-              <a:t>Diagrama de Solução</a:t>
+              <a:t>Diagrama de Arquitetura</a:t>
             </a:r>
           </a:p>
         </p:txBody>
@@ -10284,7 +10895,7 @@
         </p:blipFill>
         <p:spPr>
           <a:xfrm>
-            <a:off x="1589225" y="1054110"/>
+            <a:off x="1297677" y="1209676"/>
             <a:ext cx="9410079" cy="5353039"/>
           </a:xfrm>
           <a:prstGeom prst="rect">

</xml_diff>

<commit_message>
Java com URL e mapa linhas e website com select e option
</commit_message>
<xml_diff>
--- a/documentacao/Apresentações/Sprint 3.pptx
+++ b/documentacao/Apresentações/Sprint 3.pptx
@@ -353,7 +353,7 @@
           <a:p>
             <a:fld id="{6B8A6EFA-F786-4350-B5C0-B2D15D16C623}" type="datetimeFigureOut">
               <a:rPr lang="pt-BR" smtClean="0"/>
-              <a:t>23/06/2020</a:t>
+              <a:t>26/06/2020</a:t>
             </a:fld>
             <a:endParaRPr lang="pt-BR"/>
           </a:p>
@@ -751,7 +751,7 @@
           <a:p>
             <a:fld id="{04EB4EB8-E196-44D9-8FC3-6021E77C51A4}" type="datetimeFigureOut">
               <a:rPr lang="pt-BR" smtClean="0"/>
-              <a:t>23/06/2020</a:t>
+              <a:t>26/06/2020</a:t>
             </a:fld>
             <a:endParaRPr lang="pt-BR"/>
           </a:p>
@@ -921,7 +921,7 @@
           <a:p>
             <a:fld id="{04EB4EB8-E196-44D9-8FC3-6021E77C51A4}" type="datetimeFigureOut">
               <a:rPr lang="pt-BR" smtClean="0"/>
-              <a:t>23/06/2020</a:t>
+              <a:t>26/06/2020</a:t>
             </a:fld>
             <a:endParaRPr lang="pt-BR"/>
           </a:p>
@@ -1101,7 +1101,7 @@
           <a:p>
             <a:fld id="{04EB4EB8-E196-44D9-8FC3-6021E77C51A4}" type="datetimeFigureOut">
               <a:rPr lang="pt-BR" smtClean="0"/>
-              <a:t>23/06/2020</a:t>
+              <a:t>26/06/2020</a:t>
             </a:fld>
             <a:endParaRPr lang="pt-BR"/>
           </a:p>
@@ -1271,7 +1271,7 @@
           <a:p>
             <a:fld id="{04EB4EB8-E196-44D9-8FC3-6021E77C51A4}" type="datetimeFigureOut">
               <a:rPr lang="pt-BR" smtClean="0"/>
-              <a:t>23/06/2020</a:t>
+              <a:t>26/06/2020</a:t>
             </a:fld>
             <a:endParaRPr lang="pt-BR"/>
           </a:p>
@@ -1517,7 +1517,7 @@
           <a:p>
             <a:fld id="{04EB4EB8-E196-44D9-8FC3-6021E77C51A4}" type="datetimeFigureOut">
               <a:rPr lang="pt-BR" smtClean="0"/>
-              <a:t>23/06/2020</a:t>
+              <a:t>26/06/2020</a:t>
             </a:fld>
             <a:endParaRPr lang="pt-BR"/>
           </a:p>
@@ -1749,7 +1749,7 @@
           <a:p>
             <a:fld id="{04EB4EB8-E196-44D9-8FC3-6021E77C51A4}" type="datetimeFigureOut">
               <a:rPr lang="pt-BR" smtClean="0"/>
-              <a:t>23/06/2020</a:t>
+              <a:t>26/06/2020</a:t>
             </a:fld>
             <a:endParaRPr lang="pt-BR"/>
           </a:p>
@@ -2116,7 +2116,7 @@
           <a:p>
             <a:fld id="{04EB4EB8-E196-44D9-8FC3-6021E77C51A4}" type="datetimeFigureOut">
               <a:rPr lang="pt-BR" smtClean="0"/>
-              <a:t>23/06/2020</a:t>
+              <a:t>26/06/2020</a:t>
             </a:fld>
             <a:endParaRPr lang="pt-BR"/>
           </a:p>
@@ -2234,7 +2234,7 @@
           <a:p>
             <a:fld id="{04EB4EB8-E196-44D9-8FC3-6021E77C51A4}" type="datetimeFigureOut">
               <a:rPr lang="pt-BR" smtClean="0"/>
-              <a:t>23/06/2020</a:t>
+              <a:t>26/06/2020</a:t>
             </a:fld>
             <a:endParaRPr lang="pt-BR"/>
           </a:p>
@@ -2329,7 +2329,7 @@
           <a:p>
             <a:fld id="{04EB4EB8-E196-44D9-8FC3-6021E77C51A4}" type="datetimeFigureOut">
               <a:rPr lang="pt-BR" smtClean="0"/>
-              <a:t>23/06/2020</a:t>
+              <a:t>26/06/2020</a:t>
             </a:fld>
             <a:endParaRPr lang="pt-BR"/>
           </a:p>
@@ -2606,7 +2606,7 @@
           <a:p>
             <a:fld id="{04EB4EB8-E196-44D9-8FC3-6021E77C51A4}" type="datetimeFigureOut">
               <a:rPr lang="pt-BR" smtClean="0"/>
-              <a:t>23/06/2020</a:t>
+              <a:t>26/06/2020</a:t>
             </a:fld>
             <a:endParaRPr lang="pt-BR"/>
           </a:p>
@@ -2863,7 +2863,7 @@
           <a:p>
             <a:fld id="{04EB4EB8-E196-44D9-8FC3-6021E77C51A4}" type="datetimeFigureOut">
               <a:rPr lang="pt-BR" smtClean="0"/>
-              <a:t>23/06/2020</a:t>
+              <a:t>26/06/2020</a:t>
             </a:fld>
             <a:endParaRPr lang="pt-BR"/>
           </a:p>
@@ -3076,7 +3076,7 @@
           <a:p>
             <a:fld id="{04EB4EB8-E196-44D9-8FC3-6021E77C51A4}" type="datetimeFigureOut">
               <a:rPr lang="pt-BR" smtClean="0"/>
-              <a:t>23/06/2020</a:t>
+              <a:t>26/06/2020</a:t>
             </a:fld>
             <a:endParaRPr lang="pt-BR"/>
           </a:p>
@@ -10372,7 +10372,7 @@
         </p:nvSpPr>
         <p:spPr>
           <a:xfrm>
-            <a:off x="940042" y="4087452"/>
+            <a:off x="940041" y="3837322"/>
             <a:ext cx="1396971" cy="622853"/>
           </a:xfrm>
           <a:prstGeom prst="rect">
@@ -10443,7 +10443,7 @@
         </p:nvSpPr>
         <p:spPr>
           <a:xfrm>
-            <a:off x="538122" y="2781536"/>
+            <a:off x="454477" y="2584612"/>
             <a:ext cx="5641523" cy="758826"/>
           </a:xfrm>
           <a:prstGeom prst="rect">
@@ -10591,7 +10591,7 @@
         </p:blipFill>
         <p:spPr>
           <a:xfrm>
-            <a:off x="7262192" y="1450022"/>
+            <a:off x="8321531" y="1483019"/>
             <a:ext cx="1266716" cy="1298517"/>
           </a:xfrm>
           <a:prstGeom prst="rect">
@@ -10850,7 +10850,7 @@
         </p:nvSpPr>
         <p:spPr>
           <a:xfrm>
-            <a:off x="940045" y="3540362"/>
+            <a:off x="940042" y="3306909"/>
             <a:ext cx="3174755" cy="622853"/>
           </a:xfrm>
           <a:prstGeom prst="rect">
@@ -11004,6 +11004,70 @@
           </a:prstGeom>
         </p:spPr>
       </p:pic>
+      <p:sp>
+        <p:nvSpPr>
+          <p:cNvPr id="17" name="Título 1">
+            <a:extLst>
+              <a:ext uri="{FF2B5EF4-FFF2-40B4-BE49-F238E27FC236}">
+                <a16:creationId xmlns:a16="http://schemas.microsoft.com/office/drawing/2014/main" id="{DE9E4F40-71B9-4085-95FA-A0FEF0D7D45B}"/>
+              </a:ext>
+            </a:extLst>
+          </p:cNvPr>
+          <p:cNvSpPr txBox="1">
+            <a:spLocks/>
+          </p:cNvSpPr>
+          <p:nvPr/>
+        </p:nvSpPr>
+        <p:spPr>
+          <a:xfrm>
+            <a:off x="940041" y="4373707"/>
+            <a:ext cx="3711472" cy="622853"/>
+          </a:xfrm>
+          <a:prstGeom prst="rect">
+            <a:avLst/>
+          </a:prstGeom>
+        </p:spPr>
+        <p:txBody>
+          <a:bodyPr vert="horz" lIns="91440" tIns="45720" rIns="91440" bIns="45720" rtlCol="0" anchor="ctr">
+            <a:noAutofit/>
+          </a:bodyPr>
+          <a:lstStyle>
+            <a:lvl1pPr algn="l" defTabSz="914400" rtl="0" eaLnBrk="1" latinLnBrk="0" hangingPunct="1">
+              <a:lnSpc>
+                <a:spcPct val="90000"/>
+              </a:lnSpc>
+              <a:spcBef>
+                <a:spcPct val="0"/>
+              </a:spcBef>
+              <a:buNone/>
+              <a:defRPr sz="4400" kern="1200">
+                <a:solidFill>
+                  <a:schemeClr val="tx1"/>
+                </a:solidFill>
+                <a:latin typeface="+mj-lt"/>
+                <a:ea typeface="+mj-ea"/>
+                <a:cs typeface="+mj-cs"/>
+              </a:defRPr>
+            </a:lvl1pPr>
+          </a:lstStyle>
+          <a:p>
+            <a:pPr marL="342900" indent="-342900">
+              <a:buFont typeface="Arial" panose="020B0604020202020204" pitchFamily="34" charset="0"/>
+              <a:buChar char="•"/>
+            </a:pPr>
+            <a:r>
+              <a:rPr lang="pt-BR" sz="2000" dirty="0">
+                <a:solidFill>
+                  <a:srgbClr val="B02F75"/>
+                </a:solidFill>
+                <a:latin typeface="Dubai Medium" panose="020B0603030403030204" pitchFamily="34" charset="-78"/>
+                <a:cs typeface="Dubai Medium" panose="020B0603030403030204" pitchFamily="34" charset="-78"/>
+              </a:rPr>
+              <a:t>Padrão de projeto no Java</a:t>
+            </a:r>
+          </a:p>
+        </p:txBody>
+      </p:sp>
     </p:spTree>
     <p:extLst>
       <p:ext uri="{BB962C8B-B14F-4D97-AF65-F5344CB8AC3E}">

</xml_diff>